<commit_message>
Small corrections in presentations
</commit_message>
<xml_diff>
--- a/Presentations/1.0  Seasonal adjustment.pptx
+++ b/Presentations/1.0  Seasonal adjustment.pptx
@@ -8784,7 +8784,7 @@
         <p:spPr/>
         <p:txBody>
           <a:bodyPr>
-            <a:normAutofit fontScale="92500" lnSpcReduction="20000"/>
+            <a:normAutofit fontScale="77500" lnSpcReduction="20000"/>
           </a:bodyPr>
           <a:lstStyle/>
           <a:p>
@@ -8798,7 +8798,7 @@
             </a:r>
             <a:r>
               <a:rPr lang="fr-BE" dirty="0" err="1"/>
-              <a:t>Jdemetra</a:t>
+              <a:t>JDemetra</a:t>
             </a:r>
             <a:r>
               <a:rPr lang="fr-BE" dirty="0"/>
@@ -8831,6 +8831,17 @@
           <a:p>
             <a:r>
               <a:rPr lang="fr-BE" dirty="0"/>
+              <a:t>Short tutorial on time </a:t>
+            </a:r>
+            <a:r>
+              <a:rPr lang="fr-BE" dirty="0" err="1"/>
+              <a:t>series</a:t>
+            </a:r>
+            <a:endParaRPr lang="fr-BE" dirty="0"/>
+          </a:p>
+          <a:p>
+            <a:r>
+              <a:rPr lang="fr-BE" dirty="0"/>
               <a:t>Pre-</a:t>
             </a:r>
             <a:r>
@@ -8929,7 +8940,7 @@
             </a:r>
             <a:r>
               <a:rPr lang="fr-BE" dirty="0"/>
-              <a:t>, X11, STS, STL…</a:t>
+              <a:t>, X11, STL, STS…</a:t>
             </a:r>
           </a:p>
           <a:p>
@@ -8951,6 +8962,17 @@
           </a:p>
           <a:p>
             <a:r>
+              <a:rPr lang="fr-BE" dirty="0"/>
+              <a:t>Routine SA </a:t>
+            </a:r>
+            <a:r>
+              <a:rPr lang="fr-BE" dirty="0" err="1"/>
+              <a:t>processing</a:t>
+            </a:r>
+            <a:endParaRPr lang="fr-BE" dirty="0"/>
+          </a:p>
+          <a:p>
+            <a:r>
               <a:rPr lang="fr-BE" dirty="0" err="1"/>
               <a:t>Specific</a:t>
             </a:r>
@@ -8980,6 +9002,7 @@
             <a:endParaRPr lang="fr-BE" dirty="0"/>
           </a:p>
           <a:p>
+            <a:pPr lvl="1"/>
             <a:r>
               <a:rPr lang="fr-BE" dirty="0"/>
               <a:t>High-</a:t>

</xml_diff>